<commit_message>
mise a jour partielle spécifications tech
</commit_message>
<xml_diff>
--- a/Présentation+Soufiane.pptx
+++ b/Présentation+Soufiane.pptx
@@ -7516,7 +7516,37 @@
                 <a:cs typeface="Montserrat"/>
                 <a:sym typeface="Montserrat"/>
               </a:rPr>
-              <a:t> afin d’être en mesure de proposer une solution pérenne et au niveau des dernières évolutions en termes de sécurité.</a:t>
+              <a:t> afin d’être </a:t>
+            </a:r>
+            <a:r>
+              <a:rPr lang="fr-FR" sz="1600" dirty="0">
+                <a:solidFill>
+                  <a:srgbClr val="0D0D0D"/>
+                </a:solidFill>
+                <a:highlight>
+                  <a:srgbClr val="FFFFFF"/>
+                </a:highlight>
+                <a:latin typeface="Montserrat"/>
+                <a:ea typeface="Montserrat"/>
+                <a:cs typeface="Montserrat"/>
+                <a:sym typeface="Montserrat"/>
+              </a:rPr>
+              <a:t>en</a:t>
+            </a:r>
+            <a:r>
+              <a:rPr lang="fr-FR" sz="1800" dirty="0">
+                <a:solidFill>
+                  <a:srgbClr val="0D0D0D"/>
+                </a:solidFill>
+                <a:highlight>
+                  <a:srgbClr val="FFFFFF"/>
+                </a:highlight>
+                <a:latin typeface="Montserrat"/>
+                <a:ea typeface="Montserrat"/>
+                <a:cs typeface="Montserrat"/>
+                <a:sym typeface="Montserrat"/>
+              </a:rPr>
+              <a:t> mesure de proposer une solution pérenne et au niveau des dernières évolutions en termes de sécurité.</a:t>
             </a:r>
           </a:p>
           <a:p>
@@ -10460,7 +10490,7 @@
               </a:spcAft>
               <a:buNone/>
             </a:pPr>
-            <a:endParaRPr>
+            <a:endParaRPr dirty="0">
               <a:latin typeface="Montserrat"/>
               <a:ea typeface="Montserrat"/>
               <a:cs typeface="Montserrat"/>
@@ -10477,7 +10507,7 @@
               </a:spcAft>
               <a:buNone/>
             </a:pPr>
-            <a:endParaRPr>
+            <a:endParaRPr dirty="0">
               <a:latin typeface="Montserrat"/>
               <a:ea typeface="Montserrat"/>
               <a:cs typeface="Montserrat"/>
@@ -10494,7 +10524,7 @@
               </a:spcAft>
               <a:buNone/>
             </a:pPr>
-            <a:endParaRPr>
+            <a:endParaRPr dirty="0">
               <a:latin typeface="Montserrat"/>
               <a:ea typeface="Montserrat"/>
               <a:cs typeface="Montserrat"/>
@@ -10682,15 +10712,6 @@
               <a:buNone/>
             </a:pPr>
             <a:r>
-              <a:rPr lang="fr" dirty="0">
-                <a:latin typeface="Montserrat"/>
-                <a:ea typeface="Montserrat"/>
-                <a:cs typeface="Montserrat"/>
-                <a:sym typeface="Montserrat"/>
-              </a:rPr>
-              <a:t>Ne pas oublier </a:t>
-            </a:r>
-            <a:r>
               <a:rPr lang="fr" sz="1500" dirty="0">
                 <a:solidFill>
                   <a:srgbClr val="0D0D0D"/>
@@ -10703,7 +10724,7 @@
                 <a:cs typeface="Montserrat"/>
                 <a:sym typeface="Montserrat"/>
               </a:rPr>
-              <a:t>la mise en public du lien du tableau</a:t>
+              <a:t>Lien public du tableau:</a:t>
             </a:r>
             <a:endParaRPr dirty="0">
               <a:latin typeface="Montserrat"/>
@@ -10788,6 +10809,44 @@
           </a:ln>
         </p:spPr>
       </p:pic>
+      <p:sp>
+        <p:nvSpPr>
+          <p:cNvPr id="2" name="ZoneTexte 1">
+            <a:extLst>
+              <a:ext uri="{FF2B5EF4-FFF2-40B4-BE49-F238E27FC236}">
+                <a16:creationId xmlns:a16="http://schemas.microsoft.com/office/drawing/2014/main" id="{28E43AC2-A9DE-CBE9-04F9-B6A96A41A4B1}"/>
+              </a:ext>
+            </a:extLst>
+          </p:cNvPr>
+          <p:cNvSpPr txBox="1"/>
+          <p:nvPr/>
+        </p:nvSpPr>
+        <p:spPr>
+          <a:xfrm>
+            <a:off x="311700" y="2435393"/>
+            <a:ext cx="8520600" cy="523220"/>
+          </a:xfrm>
+          <a:prstGeom prst="rect">
+            <a:avLst/>
+          </a:prstGeom>
+          <a:noFill/>
+        </p:spPr>
+        <p:txBody>
+          <a:bodyPr wrap="square" rtlCol="0">
+            <a:spAutoFit/>
+          </a:bodyPr>
+          <a:lstStyle/>
+          <a:p>
+            <a:r>
+              <a:rPr lang="fr-FR" dirty="0">
+                <a:hlinkClick r:id="rId4"/>
+              </a:rPr>
+              <a:t>https://fifth-couch-888.notion.site/ae90e83594fc40cc9a50376884517cc9?v=f944c792d0dc4e5b9e8642a8993bccfe&amp;pvs=4</a:t>
+            </a:r>
+            <a:endParaRPr lang="fr-FR" dirty="0"/>
+          </a:p>
+        </p:txBody>
+      </p:sp>
     </p:spTree>
   </p:cSld>
   <p:clrMapOvr>

</xml_diff>

<commit_message>
Modification des deux fichiers
</commit_message>
<xml_diff>
--- a/Présentation+Soufiane.pptx
+++ b/Présentation+Soufiane.pptx
@@ -11241,10 +11241,10 @@
       </p:pic>
       <p:pic>
         <p:nvPicPr>
-          <p:cNvPr id="9" name="Image 8">
+          <p:cNvPr id="7" name="Image 6">
             <a:extLst>
               <a:ext uri="{FF2B5EF4-FFF2-40B4-BE49-F238E27FC236}">
-                <a16:creationId xmlns:a16="http://schemas.microsoft.com/office/drawing/2014/main" id="{90067BA5-84BB-A25E-8C95-70114BD4D0A5}"/>
+                <a16:creationId xmlns:a16="http://schemas.microsoft.com/office/drawing/2014/main" id="{28339DD2-154B-A3DB-55BF-81C9D09DEC44}"/>
               </a:ext>
             </a:extLst>
           </p:cNvPr>
@@ -11261,8 +11261,8 @@
         </p:blipFill>
         <p:spPr>
           <a:xfrm>
-            <a:off x="375316" y="1282075"/>
-            <a:ext cx="5932646" cy="3416400"/>
+            <a:off x="6035003" y="1193792"/>
+            <a:ext cx="2797297" cy="3333765"/>
           </a:xfrm>
           <a:prstGeom prst="rect">
             <a:avLst/>
@@ -11271,10 +11271,10 @@
       </p:pic>
       <p:pic>
         <p:nvPicPr>
-          <p:cNvPr id="13" name="Image 12">
+          <p:cNvPr id="10" name="Image 9">
             <a:extLst>
               <a:ext uri="{FF2B5EF4-FFF2-40B4-BE49-F238E27FC236}">
-                <a16:creationId xmlns:a16="http://schemas.microsoft.com/office/drawing/2014/main" id="{290A29C4-C90B-047E-7C26-16DAC6D1970A}"/>
+                <a16:creationId xmlns:a16="http://schemas.microsoft.com/office/drawing/2014/main" id="{8E29BDAC-C2F2-ADEB-A077-2FCA11D5D1B0}"/>
               </a:ext>
             </a:extLst>
           </p:cNvPr>
@@ -11291,8 +11291,8 @@
         </p:blipFill>
         <p:spPr>
           <a:xfrm>
-            <a:off x="6172722" y="1152475"/>
-            <a:ext cx="2971278" cy="3861425"/>
+            <a:off x="235545" y="1152475"/>
+            <a:ext cx="5538201" cy="3600028"/>
           </a:xfrm>
           <a:prstGeom prst="rect">
             <a:avLst/>
@@ -12193,10 +12193,10 @@
       </p:pic>
       <p:pic>
         <p:nvPicPr>
-          <p:cNvPr id="6" name="Image 5">
+          <p:cNvPr id="3" name="Image 2">
             <a:extLst>
               <a:ext uri="{FF2B5EF4-FFF2-40B4-BE49-F238E27FC236}">
-                <a16:creationId xmlns:a16="http://schemas.microsoft.com/office/drawing/2014/main" id="{E7D4D090-51D4-A2F7-BD00-2E79678C7494}"/>
+                <a16:creationId xmlns:a16="http://schemas.microsoft.com/office/drawing/2014/main" id="{96635AFE-571A-C33F-B67C-32D0BD6F91B1}"/>
               </a:ext>
             </a:extLst>
           </p:cNvPr>
@@ -12213,8 +12213,8 @@
         </p:blipFill>
         <p:spPr>
           <a:xfrm>
-            <a:off x="1086174" y="1017725"/>
-            <a:ext cx="6827168" cy="3898821"/>
+            <a:off x="923002" y="915289"/>
+            <a:ext cx="7344046" cy="4180083"/>
           </a:xfrm>
           <a:prstGeom prst="rect">
             <a:avLst/>

</xml_diff>